<commit_message>
nueva url de ficha técnica e imágenes
</commit_message>
<xml_diff>
--- a/obras/static/ppt/HIPERVINCULO_INFORMACION_GENERAL.pptx
+++ b/obras/static/ppt/HIPERVINCULO_INFORMACION_GENERAL.pptx
@@ -194,7 +194,7 @@
           <a:p>
             <a:fld id="{56612B8C-D436-442C-AF8F-F0830C8620CD}" type="datetimeFigureOut">
               <a:rPr lang="es-MX" smtClean="0"/>
-              <a:t>09/04/2015</a:t>
+              <a:t>22/07/2015</a:t>
             </a:fld>
             <a:endParaRPr lang="es-MX"/>
           </a:p>
@@ -643,7 +643,7 @@
           <a:p>
             <a:fld id="{46C625CF-D8F4-6941-B2C3-3F15474FDD83}" type="datetimeFigureOut">
               <a:rPr lang="es-ES" smtClean="0"/>
-              <a:t>09/04/2015</a:t>
+              <a:t>22/07/2015</a:t>
             </a:fld>
             <a:endParaRPr lang="es-ES"/>
           </a:p>
@@ -813,7 +813,7 @@
           <a:p>
             <a:fld id="{46C625CF-D8F4-6941-B2C3-3F15474FDD83}" type="datetimeFigureOut">
               <a:rPr lang="es-ES" smtClean="0"/>
-              <a:t>09/04/2015</a:t>
+              <a:t>22/07/2015</a:t>
             </a:fld>
             <a:endParaRPr lang="es-ES"/>
           </a:p>
@@ -993,7 +993,7 @@
           <a:p>
             <a:fld id="{46C625CF-D8F4-6941-B2C3-3F15474FDD83}" type="datetimeFigureOut">
               <a:rPr lang="es-ES" smtClean="0"/>
-              <a:t>09/04/2015</a:t>
+              <a:t>22/07/2015</a:t>
             </a:fld>
             <a:endParaRPr lang="es-ES"/>
           </a:p>
@@ -1163,7 +1163,7 @@
           <a:p>
             <a:fld id="{46C625CF-D8F4-6941-B2C3-3F15474FDD83}" type="datetimeFigureOut">
               <a:rPr lang="es-ES" smtClean="0"/>
-              <a:t>09/04/2015</a:t>
+              <a:t>22/07/2015</a:t>
             </a:fld>
             <a:endParaRPr lang="es-ES"/>
           </a:p>
@@ -1409,7 +1409,7 @@
           <a:p>
             <a:fld id="{46C625CF-D8F4-6941-B2C3-3F15474FDD83}" type="datetimeFigureOut">
               <a:rPr lang="es-ES" smtClean="0"/>
-              <a:t>09/04/2015</a:t>
+              <a:t>22/07/2015</a:t>
             </a:fld>
             <a:endParaRPr lang="es-ES"/>
           </a:p>
@@ -1697,7 +1697,7 @@
           <a:p>
             <a:fld id="{46C625CF-D8F4-6941-B2C3-3F15474FDD83}" type="datetimeFigureOut">
               <a:rPr lang="es-ES" smtClean="0"/>
-              <a:t>09/04/2015</a:t>
+              <a:t>22/07/2015</a:t>
             </a:fld>
             <a:endParaRPr lang="es-ES"/>
           </a:p>
@@ -2119,7 +2119,7 @@
           <a:p>
             <a:fld id="{46C625CF-D8F4-6941-B2C3-3F15474FDD83}" type="datetimeFigureOut">
               <a:rPr lang="es-ES" smtClean="0"/>
-              <a:t>09/04/2015</a:t>
+              <a:t>22/07/2015</a:t>
             </a:fld>
             <a:endParaRPr lang="es-ES"/>
           </a:p>
@@ -2237,7 +2237,7 @@
           <a:p>
             <a:fld id="{46C625CF-D8F4-6941-B2C3-3F15474FDD83}" type="datetimeFigureOut">
               <a:rPr lang="es-ES" smtClean="0"/>
-              <a:t>09/04/2015</a:t>
+              <a:t>22/07/2015</a:t>
             </a:fld>
             <a:endParaRPr lang="es-ES"/>
           </a:p>
@@ -2332,7 +2332,7 @@
           <a:p>
             <a:fld id="{46C625CF-D8F4-6941-B2C3-3F15474FDD83}" type="datetimeFigureOut">
               <a:rPr lang="es-ES" smtClean="0"/>
-              <a:t>09/04/2015</a:t>
+              <a:t>22/07/2015</a:t>
             </a:fld>
             <a:endParaRPr lang="es-ES"/>
           </a:p>
@@ -2609,7 +2609,7 @@
           <a:p>
             <a:fld id="{46C625CF-D8F4-6941-B2C3-3F15474FDD83}" type="datetimeFigureOut">
               <a:rPr lang="es-ES" smtClean="0"/>
-              <a:t>09/04/2015</a:t>
+              <a:t>22/07/2015</a:t>
             </a:fld>
             <a:endParaRPr lang="es-ES"/>
           </a:p>
@@ -2862,7 +2862,7 @@
           <a:p>
             <a:fld id="{46C625CF-D8F4-6941-B2C3-3F15474FDD83}" type="datetimeFigureOut">
               <a:rPr lang="es-ES" smtClean="0"/>
-              <a:t>09/04/2015</a:t>
+              <a:t>22/07/2015</a:t>
             </a:fld>
             <a:endParaRPr lang="es-ES"/>
           </a:p>
@@ -3081,7 +3081,7 @@
           <a:p>
             <a:fld id="{46C625CF-D8F4-6941-B2C3-3F15474FDD83}" type="datetimeFigureOut">
               <a:rPr lang="es-ES" smtClean="0"/>
-              <a:t>09/04/2015</a:t>
+              <a:t>22/07/2015</a:t>
             </a:fld>
             <a:endParaRPr lang="es-ES"/>
           </a:p>
@@ -3169,7 +3169,7 @@
         <p:nvSpPr>
           <p:cNvPr id="7" name="CuadroTexto 6"/>
           <p:cNvSpPr txBox="1"/>
-          <p:nvPr userDrawn="1"/>
+          <p:nvPr/>
         </p:nvSpPr>
         <p:spPr>
           <a:xfrm>
@@ -3568,7 +3568,7 @@
           <p:nvPr>
             <p:extLst>
               <p:ext uri="{D42A27DB-BD31-4B8C-83A1-F6EECF244321}">
-                <p14:modId xmlns:p14="http://schemas.microsoft.com/office/powerpoint/2010/main" val="2933465960"/>
+                <p14:modId xmlns:p14="http://schemas.microsoft.com/office/powerpoint/2010/main" val="434632490"/>
               </p:ext>
             </p:extLst>
           </p:nvPr>
@@ -4039,93 +4039,6 @@
                       </a:endParaRPr>
                     </a:p>
                     <a:p>
-                      <a:pPr marL="0" indent="0" algn="ctr">
-                        <a:buClr>
-                          <a:srgbClr val="C00000"/>
-                        </a:buClr>
-                        <a:buFont typeface="Arial" panose="020B0604020202020204" pitchFamily="34" charset="0"/>
-                        <a:buNone/>
-                      </a:pPr>
-                      <a:endParaRPr lang="es-MX" sz="1500" kern="1200" dirty="0" smtClean="0">
-                        <a:solidFill>
-                          <a:schemeClr val="tx1">
-                            <a:lumMod val="75000"/>
-                            <a:lumOff val="25000"/>
-                          </a:schemeClr>
-                        </a:solidFill>
-                        <a:effectLst/>
-                        <a:latin typeface="Arial Narrow" panose="020B0606020202030204" pitchFamily="34" charset="0"/>
-                        <a:ea typeface="+mn-ea"/>
-                        <a:cs typeface="+mn-cs"/>
-                      </a:endParaRPr>
-                    </a:p>
-                    <a:p>
-                      <a:pPr marL="0" indent="0" algn="ctr">
-                        <a:buClr>
-                          <a:srgbClr val="C00000"/>
-                        </a:buClr>
-                        <a:buFont typeface="Arial" panose="020B0604020202020204" pitchFamily="34" charset="0"/>
-                        <a:buNone/>
-                      </a:pPr>
-                      <a:endParaRPr lang="es-MX" sz="1500" kern="1200" dirty="0" smtClean="0">
-                        <a:solidFill>
-                          <a:schemeClr val="tx1">
-                            <a:lumMod val="75000"/>
-                            <a:lumOff val="25000"/>
-                          </a:schemeClr>
-                        </a:solidFill>
-                        <a:effectLst/>
-                        <a:latin typeface="Arial Narrow" panose="020B0606020202030204" pitchFamily="34" charset="0"/>
-                        <a:ea typeface="+mn-ea"/>
-                        <a:cs typeface="+mn-cs"/>
-                      </a:endParaRPr>
-                    </a:p>
-                    <a:p>
-                      <a:pPr marL="0" indent="0" algn="ctr">
-                        <a:buClr>
-                          <a:srgbClr val="C00000"/>
-                        </a:buClr>
-                        <a:buFont typeface="Arial" panose="020B0604020202020204" pitchFamily="34" charset="0"/>
-                        <a:buNone/>
-                      </a:pPr>
-                      <a:endParaRPr lang="es-MX" sz="1500" kern="1200" dirty="0" smtClean="0">
-                        <a:solidFill>
-                          <a:schemeClr val="tx1">
-                            <a:lumMod val="75000"/>
-                            <a:lumOff val="25000"/>
-                          </a:schemeClr>
-                        </a:solidFill>
-                        <a:effectLst/>
-                        <a:latin typeface="Arial Narrow" panose="020B0606020202030204" pitchFamily="34" charset="0"/>
-                        <a:ea typeface="+mn-ea"/>
-                        <a:cs typeface="+mn-cs"/>
-                      </a:endParaRPr>
-                    </a:p>
-                    <a:p>
-                      <a:pPr algn="ctr"/>
-                      <a:endParaRPr lang="es-MX" sz="1800" b="1" kern="1200" dirty="0" smtClean="0">
-                        <a:solidFill>
-                          <a:srgbClr val="C00000"/>
-                        </a:solidFill>
-                        <a:effectLst/>
-                        <a:latin typeface="Arial Narrow" panose="020B0606020202030204" pitchFamily="34" charset="0"/>
-                        <a:ea typeface="+mn-ea"/>
-                        <a:cs typeface="+mn-cs"/>
-                      </a:endParaRPr>
-                    </a:p>
-                    <a:p>
-                      <a:pPr algn="ctr"/>
-                      <a:endParaRPr lang="es-MX" sz="1800" b="1" kern="1200" dirty="0" smtClean="0">
-                        <a:solidFill>
-                          <a:srgbClr val="C00000"/>
-                        </a:solidFill>
-                        <a:effectLst/>
-                        <a:latin typeface="Arial Narrow" panose="020B0606020202030204" pitchFamily="34" charset="0"/>
-                        <a:ea typeface="+mn-ea"/>
-                        <a:cs typeface="+mn-cs"/>
-                      </a:endParaRPr>
-                    </a:p>
-                    <a:p>
                       <a:pPr algn="ctr"/>
                       <a:endParaRPr lang="es-MX" sz="1800" b="1" kern="1200" dirty="0" smtClean="0">
                         <a:solidFill>
@@ -4140,30 +4053,19 @@
                     <a:p>
                       <a:pPr algn="ctr"/>
                       <a:r>
-                        <a:rPr lang="es-MX" sz="1800" b="1" kern="1200" dirty="0" smtClean="0">
+                        <a:rPr lang="es-MX" sz="1400" b="1" kern="1200" spc="300" dirty="0" smtClean="0">
                           <a:solidFill>
                             <a:srgbClr val="C00000"/>
                           </a:solidFill>
-                          <a:effectLst/>
                           <a:latin typeface="Arial Narrow" panose="020B0606020202030204" pitchFamily="34" charset="0"/>
                           <a:ea typeface="+mn-ea"/>
                           <a:cs typeface="+mn-cs"/>
                         </a:rPr>
-                        <a:t>INFORMACIÓN </a:t>
+                        <a:t>INFORMACIÓN GENERAL</a:t>
                       </a:r>
-                      <a:r>
-                        <a:rPr lang="es-MX" sz="1800" b="1" kern="1200" dirty="0" smtClean="0">
-                          <a:solidFill>
-                            <a:srgbClr val="C00000"/>
-                          </a:solidFill>
-                          <a:effectLst/>
-                          <a:latin typeface="Arial Narrow" panose="020B0606020202030204" pitchFamily="34" charset="0"/>
-                          <a:ea typeface="+mn-ea"/>
-                          <a:cs typeface="+mn-cs"/>
-                        </a:rPr>
-                        <a:t>GENERAL</a:t>
-                      </a:r>
-                      <a:endParaRPr lang="es-MX" sz="1800" b="1" kern="1200" dirty="0" smtClean="0">
+                    </a:p>
+                    <a:p>
+                      <a:endParaRPr lang="es-MX" sz="1800" kern="1200" dirty="0" smtClean="0">
                         <a:solidFill>
                           <a:srgbClr val="C00000"/>
                         </a:solidFill>
@@ -4621,69 +4523,6 @@
               </a:rPr>
               <a:t> </a:t>
             </a:r>
-            <a:r>
-              <a:rPr lang="es-MX" sz="1200" dirty="0" smtClean="0">
-                <a:latin typeface="Arial Narrow" panose="020B0606020202030204" pitchFamily="34" charset="0"/>
-                <a:ea typeface="Calibri"/>
-                <a:cs typeface="Times New Roman"/>
-              </a:rPr>
-              <a:t/>
-            </a:r>
-            <a:br>
-              <a:rPr lang="es-MX" sz="1200" dirty="0" smtClean="0">
-                <a:latin typeface="Arial Narrow" panose="020B0606020202030204" pitchFamily="34" charset="0"/>
-                <a:ea typeface="Calibri"/>
-                <a:cs typeface="Times New Roman"/>
-              </a:rPr>
-            </a:br>
-            <a:r>
-              <a:rPr lang="es-MX" sz="1200" dirty="0" smtClean="0">
-                <a:latin typeface="Arial Narrow" panose="020B0606020202030204" pitchFamily="34" charset="0"/>
-                <a:ea typeface="Calibri"/>
-                <a:cs typeface="Times New Roman"/>
-              </a:rPr>
-              <a:t>reportadas </a:t>
-            </a:r>
-            <a:r>
-              <a:rPr lang="es-MX" sz="1200" dirty="0">
-                <a:latin typeface="Arial Narrow" panose="020B0606020202030204" pitchFamily="34" charset="0"/>
-                <a:ea typeface="Calibri"/>
-                <a:cs typeface="Times New Roman"/>
-              </a:rPr>
-              <a:t>por las </a:t>
-            </a:r>
-            <a:r>
-              <a:rPr lang="es-MX" sz="1200" dirty="0" smtClean="0">
-                <a:latin typeface="Arial Narrow" panose="020B0606020202030204" pitchFamily="34" charset="0"/>
-                <a:ea typeface="Calibri"/>
-                <a:cs typeface="Times New Roman"/>
-              </a:rPr>
-              <a:t>Dependencias </a:t>
-            </a:r>
-            <a:r>
-              <a:rPr lang="es-MX" sz="1200" dirty="0">
-                <a:latin typeface="Arial Narrow" panose="020B0606020202030204" pitchFamily="34" charset="0"/>
-                <a:ea typeface="Calibri"/>
-                <a:cs typeface="Times New Roman"/>
-              </a:rPr>
-              <a:t>y Entidades </a:t>
-            </a:r>
-            <a:r>
-              <a:rPr lang="es-MX" sz="1200" dirty="0" smtClean="0">
-                <a:latin typeface="Arial Narrow" panose="020B0606020202030204" pitchFamily="34" charset="0"/>
-                <a:ea typeface="Calibri"/>
-                <a:cs typeface="Times New Roman"/>
-              </a:rPr>
-              <a:t>de </a:t>
-            </a:r>
-            <a:r>
-              <a:rPr lang="es-MX" sz="1200" dirty="0">
-                <a:latin typeface="Arial Narrow" panose="020B0606020202030204" pitchFamily="34" charset="0"/>
-                <a:ea typeface="Calibri"/>
-                <a:cs typeface="Times New Roman"/>
-              </a:rPr>
-              <a:t>la Administración Pública Federal</a:t>
-            </a:r>
             <a:endParaRPr lang="es-MX" sz="1200" dirty="0">
               <a:solidFill>
                 <a:schemeClr val="bg1">
@@ -4737,7 +4576,7 @@
         </p:nvSpPr>
         <p:spPr>
           <a:xfrm>
-            <a:off x="2764457" y="4550733"/>
+            <a:off x="2764457" y="3554429"/>
             <a:ext cx="940644" cy="307777"/>
           </a:xfrm>
           <a:prstGeom prst="rect">
@@ -4772,7 +4611,7 @@
         </p:nvSpPr>
         <p:spPr>
           <a:xfrm>
-            <a:off x="4433778" y="4835001"/>
+            <a:off x="4433778" y="3852345"/>
             <a:ext cx="1337630" cy="307777"/>
           </a:xfrm>
           <a:prstGeom prst="rect">
@@ -4842,7 +4681,7 @@
           <p:nvPr>
             <p:extLst>
               <p:ext uri="{D42A27DB-BD31-4B8C-83A1-F6EECF244321}">
-                <p14:modId xmlns:p14="http://schemas.microsoft.com/office/powerpoint/2010/main" val="3302548228"/>
+                <p14:modId xmlns:p14="http://schemas.microsoft.com/office/powerpoint/2010/main" val="484720535"/>
               </p:ext>
             </p:extLst>
           </p:nvPr>
@@ -5313,93 +5152,6 @@
                       </a:endParaRPr>
                     </a:p>
                     <a:p>
-                      <a:pPr marL="0" indent="0" algn="ctr">
-                        <a:buClr>
-                          <a:srgbClr val="C00000"/>
-                        </a:buClr>
-                        <a:buFont typeface="Arial" panose="020B0604020202020204" pitchFamily="34" charset="0"/>
-                        <a:buNone/>
-                      </a:pPr>
-                      <a:endParaRPr lang="es-MX" sz="1500" kern="1200" dirty="0" smtClean="0">
-                        <a:solidFill>
-                          <a:schemeClr val="tx1">
-                            <a:lumMod val="75000"/>
-                            <a:lumOff val="25000"/>
-                          </a:schemeClr>
-                        </a:solidFill>
-                        <a:effectLst/>
-                        <a:latin typeface="Arial Narrow" panose="020B0606020202030204" pitchFamily="34" charset="0"/>
-                        <a:ea typeface="+mn-ea"/>
-                        <a:cs typeface="+mn-cs"/>
-                      </a:endParaRPr>
-                    </a:p>
-                    <a:p>
-                      <a:pPr marL="0" indent="0" algn="ctr">
-                        <a:buClr>
-                          <a:srgbClr val="C00000"/>
-                        </a:buClr>
-                        <a:buFont typeface="Arial" panose="020B0604020202020204" pitchFamily="34" charset="0"/>
-                        <a:buNone/>
-                      </a:pPr>
-                      <a:endParaRPr lang="es-MX" sz="1500" kern="1200" dirty="0" smtClean="0">
-                        <a:solidFill>
-                          <a:schemeClr val="tx1">
-                            <a:lumMod val="75000"/>
-                            <a:lumOff val="25000"/>
-                          </a:schemeClr>
-                        </a:solidFill>
-                        <a:effectLst/>
-                        <a:latin typeface="Arial Narrow" panose="020B0606020202030204" pitchFamily="34" charset="0"/>
-                        <a:ea typeface="+mn-ea"/>
-                        <a:cs typeface="+mn-cs"/>
-                      </a:endParaRPr>
-                    </a:p>
-                    <a:p>
-                      <a:pPr marL="0" indent="0" algn="ctr">
-                        <a:buClr>
-                          <a:srgbClr val="C00000"/>
-                        </a:buClr>
-                        <a:buFont typeface="Arial" panose="020B0604020202020204" pitchFamily="34" charset="0"/>
-                        <a:buNone/>
-                      </a:pPr>
-                      <a:endParaRPr lang="es-MX" sz="1500" kern="1200" dirty="0" smtClean="0">
-                        <a:solidFill>
-                          <a:schemeClr val="tx1">
-                            <a:lumMod val="75000"/>
-                            <a:lumOff val="25000"/>
-                          </a:schemeClr>
-                        </a:solidFill>
-                        <a:effectLst/>
-                        <a:latin typeface="Arial Narrow" panose="020B0606020202030204" pitchFamily="34" charset="0"/>
-                        <a:ea typeface="+mn-ea"/>
-                        <a:cs typeface="+mn-cs"/>
-                      </a:endParaRPr>
-                    </a:p>
-                    <a:p>
-                      <a:pPr algn="ctr"/>
-                      <a:endParaRPr lang="es-MX" sz="1800" b="1" kern="1200" dirty="0" smtClean="0">
-                        <a:solidFill>
-                          <a:srgbClr val="C00000"/>
-                        </a:solidFill>
-                        <a:effectLst/>
-                        <a:latin typeface="Arial Narrow" panose="020B0606020202030204" pitchFamily="34" charset="0"/>
-                        <a:ea typeface="+mn-ea"/>
-                        <a:cs typeface="+mn-cs"/>
-                      </a:endParaRPr>
-                    </a:p>
-                    <a:p>
-                      <a:pPr algn="ctr"/>
-                      <a:endParaRPr lang="es-MX" sz="1800" b="1" kern="1200" dirty="0" smtClean="0">
-                        <a:solidFill>
-                          <a:srgbClr val="C00000"/>
-                        </a:solidFill>
-                        <a:effectLst/>
-                        <a:latin typeface="Arial Narrow" panose="020B0606020202030204" pitchFamily="34" charset="0"/>
-                        <a:ea typeface="+mn-ea"/>
-                        <a:cs typeface="+mn-cs"/>
-                      </a:endParaRPr>
-                    </a:p>
-                    <a:p>
                       <a:pPr algn="ctr"/>
                       <a:endParaRPr lang="es-MX" sz="1800" b="1" kern="1200" dirty="0" smtClean="0">
                         <a:solidFill>
@@ -5414,11 +5166,10 @@
                     <a:p>
                       <a:pPr algn="ctr"/>
                       <a:r>
-                        <a:rPr lang="es-MX" sz="1800" b="1" kern="1200" dirty="0" smtClean="0">
+                        <a:rPr lang="es-MX" sz="1400" b="1" kern="1200" spc="300" dirty="0" smtClean="0">
                           <a:solidFill>
                             <a:srgbClr val="C00000"/>
                           </a:solidFill>
-                          <a:effectLst/>
                           <a:latin typeface="Arial Narrow" panose="020B0606020202030204" pitchFamily="34" charset="0"/>
                           <a:ea typeface="+mn-ea"/>
                           <a:cs typeface="+mn-cs"/>
@@ -5427,7 +5178,32 @@
                       </a:r>
                     </a:p>
                     <a:p>
-                      <a:endParaRPr lang="es-MX" sz="1800" kern="1200" dirty="0" smtClean="0">
+                      <a:pPr algn="ctr"/>
+                      <a:endParaRPr lang="es-MX" sz="1400" kern="1200" dirty="0" smtClean="0">
+                        <a:solidFill>
+                          <a:srgbClr val="C00000"/>
+                        </a:solidFill>
+                        <a:effectLst/>
+                        <a:latin typeface="Arial Narrow" panose="020B0606020202030204" pitchFamily="34" charset="0"/>
+                        <a:ea typeface="+mn-ea"/>
+                        <a:cs typeface="+mn-cs"/>
+                      </a:endParaRPr>
+                    </a:p>
+                    <a:p>
+                      <a:pPr algn="ctr"/>
+                      <a:endParaRPr lang="es-MX" sz="1400" kern="1200" dirty="0" smtClean="0">
+                        <a:solidFill>
+                          <a:srgbClr val="C00000"/>
+                        </a:solidFill>
+                        <a:effectLst/>
+                        <a:latin typeface="Arial Narrow" panose="020B0606020202030204" pitchFamily="34" charset="0"/>
+                        <a:ea typeface="+mn-ea"/>
+                        <a:cs typeface="+mn-cs"/>
+                      </a:endParaRPr>
+                    </a:p>
+                    <a:p>
+                      <a:pPr algn="ctr"/>
+                      <a:endParaRPr lang="es-MX" sz="1400" kern="1200" dirty="0" smtClean="0">
                         <a:solidFill>
                           <a:srgbClr val="C00000"/>
                         </a:solidFill>
@@ -5527,25 +5303,10 @@
                           <a:ea typeface="+mn-ea"/>
                           <a:cs typeface="+mn-cs"/>
                         </a:rPr>
-                        <a:t>un monto de inversión </a:t>
+                        <a:t>un monto de inversión de</a:t>
                       </a:r>
                       <a:r>
-                        <a:rPr lang="es-MX" sz="1800" b="0" kern="1200" smtClean="0">
-                          <a:solidFill>
-                            <a:schemeClr val="tx1">
-                              <a:lumMod val="75000"/>
-                              <a:lumOff val="25000"/>
-                            </a:schemeClr>
-                          </a:solidFill>
-                          <a:effectLst/>
-                          <a:latin typeface="Arial Narrow" panose="020B0606020202030204" pitchFamily="34" charset="0"/>
-                          <a:ea typeface="+mn-ea"/>
-                          <a:cs typeface="+mn-cs"/>
-                        </a:rPr>
-                        <a:t>de</a:t>
-                      </a:r>
-                      <a:r>
-                        <a:rPr lang="es-MX" sz="1800" b="0" kern="1200" baseline="0" smtClean="0">
+                        <a:rPr lang="es-MX" sz="1800" b="0" kern="1200" baseline="0" dirty="0" smtClean="0">
                           <a:solidFill>
                             <a:schemeClr val="tx1">
                               <a:lumMod val="75000"/>
@@ -5881,69 +5642,6 @@
               </a:rPr>
               <a:t>en Proceso </a:t>
             </a:r>
-            <a:r>
-              <a:rPr lang="es-MX" sz="1200" dirty="0" smtClean="0">
-                <a:latin typeface="Arial Narrow" panose="020B0606020202030204" pitchFamily="34" charset="0"/>
-                <a:ea typeface="Calibri"/>
-                <a:cs typeface="Times New Roman"/>
-              </a:rPr>
-              <a:t/>
-            </a:r>
-            <a:br>
-              <a:rPr lang="es-MX" sz="1200" dirty="0" smtClean="0">
-                <a:latin typeface="Arial Narrow" panose="020B0606020202030204" pitchFamily="34" charset="0"/>
-                <a:ea typeface="Calibri"/>
-                <a:cs typeface="Times New Roman"/>
-              </a:rPr>
-            </a:br>
-            <a:r>
-              <a:rPr lang="es-MX" sz="1200" dirty="0" smtClean="0">
-                <a:latin typeface="Arial Narrow" panose="020B0606020202030204" pitchFamily="34" charset="0"/>
-                <a:ea typeface="Calibri"/>
-                <a:cs typeface="Times New Roman"/>
-              </a:rPr>
-              <a:t>reportadas </a:t>
-            </a:r>
-            <a:r>
-              <a:rPr lang="es-MX" sz="1200" dirty="0">
-                <a:latin typeface="Arial Narrow" panose="020B0606020202030204" pitchFamily="34" charset="0"/>
-                <a:ea typeface="Calibri"/>
-                <a:cs typeface="Times New Roman"/>
-              </a:rPr>
-              <a:t>por las </a:t>
-            </a:r>
-            <a:r>
-              <a:rPr lang="es-MX" sz="1200" dirty="0" smtClean="0">
-                <a:latin typeface="Arial Narrow" panose="020B0606020202030204" pitchFamily="34" charset="0"/>
-                <a:ea typeface="Calibri"/>
-                <a:cs typeface="Times New Roman"/>
-              </a:rPr>
-              <a:t>Dependencias </a:t>
-            </a:r>
-            <a:r>
-              <a:rPr lang="es-MX" sz="1200" dirty="0">
-                <a:latin typeface="Arial Narrow" panose="020B0606020202030204" pitchFamily="34" charset="0"/>
-                <a:ea typeface="Calibri"/>
-                <a:cs typeface="Times New Roman"/>
-              </a:rPr>
-              <a:t>y Entidades </a:t>
-            </a:r>
-            <a:r>
-              <a:rPr lang="es-MX" sz="1200" dirty="0" smtClean="0">
-                <a:latin typeface="Arial Narrow" panose="020B0606020202030204" pitchFamily="34" charset="0"/>
-                <a:ea typeface="Calibri"/>
-                <a:cs typeface="Times New Roman"/>
-              </a:rPr>
-              <a:t>de </a:t>
-            </a:r>
-            <a:r>
-              <a:rPr lang="es-MX" sz="1200" dirty="0">
-                <a:latin typeface="Arial Narrow" panose="020B0606020202030204" pitchFamily="34" charset="0"/>
-                <a:ea typeface="Calibri"/>
-                <a:cs typeface="Times New Roman"/>
-              </a:rPr>
-              <a:t>la Administración Pública Federal</a:t>
-            </a:r>
             <a:endParaRPr lang="es-MX" sz="1200" dirty="0">
               <a:solidFill>
                 <a:schemeClr val="bg1">
@@ -5997,7 +5695,7 @@
         </p:nvSpPr>
         <p:spPr>
           <a:xfrm>
-            <a:off x="2764457" y="4550733"/>
+            <a:off x="2873641" y="3677261"/>
             <a:ext cx="786809" cy="307777"/>
           </a:xfrm>
           <a:prstGeom prst="rect">
@@ -6032,7 +5730,7 @@
         </p:nvSpPr>
         <p:spPr>
           <a:xfrm>
-            <a:off x="4358244" y="4835001"/>
+            <a:off x="4358244" y="3961529"/>
             <a:ext cx="1460664" cy="307777"/>
           </a:xfrm>
           <a:prstGeom prst="rect">
@@ -6105,7 +5803,7 @@
           <p:nvPr>
             <p:extLst>
               <p:ext uri="{D42A27DB-BD31-4B8C-83A1-F6EECF244321}">
-                <p14:modId xmlns:p14="http://schemas.microsoft.com/office/powerpoint/2010/main" val="2969941746"/>
+                <p14:modId xmlns:p14="http://schemas.microsoft.com/office/powerpoint/2010/main" val="4024626224"/>
               </p:ext>
             </p:extLst>
           </p:nvPr>
@@ -6576,71 +6274,21 @@
                       </a:endParaRPr>
                     </a:p>
                     <a:p>
-                      <a:pPr marL="0" indent="0" algn="ctr">
-                        <a:buClr>
-                          <a:srgbClr val="C00000"/>
-                        </a:buClr>
-                        <a:buFont typeface="Arial" panose="020B0604020202020204" pitchFamily="34" charset="0"/>
-                        <a:buNone/>
-                      </a:pPr>
-                      <a:endParaRPr lang="es-MX" sz="1500" kern="1200" dirty="0" smtClean="0">
-                        <a:solidFill>
-                          <a:schemeClr val="tx1">
-                            <a:lumMod val="75000"/>
-                            <a:lumOff val="25000"/>
-                          </a:schemeClr>
-                        </a:solidFill>
-                        <a:effectLst/>
-                        <a:latin typeface="Arial Narrow" panose="020B0606020202030204" pitchFamily="34" charset="0"/>
-                        <a:ea typeface="+mn-ea"/>
-                        <a:cs typeface="+mn-cs"/>
-                      </a:endParaRPr>
+                      <a:pPr algn="ctr"/>
+                      <a:r>
+                        <a:rPr lang="es-MX" sz="1400" b="1" kern="1200" spc="300" dirty="0" smtClean="0">
+                          <a:solidFill>
+                            <a:srgbClr val="C00000"/>
+                          </a:solidFill>
+                          <a:latin typeface="Arial Narrow" panose="020B0606020202030204" pitchFamily="34" charset="0"/>
+                          <a:ea typeface="+mn-ea"/>
+                          <a:cs typeface="+mn-cs"/>
+                        </a:rPr>
+                        <a:t>INFORMACIÓN GENERAL</a:t>
+                      </a:r>
                     </a:p>
                     <a:p>
-                      <a:pPr marL="0" indent="0" algn="ctr">
-                        <a:buClr>
-                          <a:srgbClr val="C00000"/>
-                        </a:buClr>
-                        <a:buFont typeface="Arial" panose="020B0604020202020204" pitchFamily="34" charset="0"/>
-                        <a:buNone/>
-                      </a:pPr>
-                      <a:endParaRPr lang="es-MX" sz="1500" kern="1200" dirty="0" smtClean="0">
-                        <a:solidFill>
-                          <a:schemeClr val="tx1">
-                            <a:lumMod val="75000"/>
-                            <a:lumOff val="25000"/>
-                          </a:schemeClr>
-                        </a:solidFill>
-                        <a:effectLst/>
-                        <a:latin typeface="Arial Narrow" panose="020B0606020202030204" pitchFamily="34" charset="0"/>
-                        <a:ea typeface="+mn-ea"/>
-                        <a:cs typeface="+mn-cs"/>
-                      </a:endParaRPr>
-                    </a:p>
-                    <a:p>
-                      <a:pPr marL="0" indent="0" algn="ctr">
-                        <a:buClr>
-                          <a:srgbClr val="C00000"/>
-                        </a:buClr>
-                        <a:buFont typeface="Arial" panose="020B0604020202020204" pitchFamily="34" charset="0"/>
-                        <a:buNone/>
-                      </a:pPr>
-                      <a:endParaRPr lang="es-MX" sz="1500" kern="1200" dirty="0" smtClean="0">
-                        <a:solidFill>
-                          <a:schemeClr val="tx1">
-                            <a:lumMod val="75000"/>
-                            <a:lumOff val="25000"/>
-                          </a:schemeClr>
-                        </a:solidFill>
-                        <a:effectLst/>
-                        <a:latin typeface="Arial Narrow" panose="020B0606020202030204" pitchFamily="34" charset="0"/>
-                        <a:ea typeface="+mn-ea"/>
-                        <a:cs typeface="+mn-cs"/>
-                      </a:endParaRPr>
-                    </a:p>
-                    <a:p>
-                      <a:pPr algn="ctr"/>
-                      <a:endParaRPr lang="es-MX" sz="1800" b="1" kern="1200" dirty="0" smtClean="0">
+                      <a:endParaRPr lang="es-MX" sz="1800" kern="1200" dirty="0" smtClean="0">
                         <a:solidFill>
                           <a:srgbClr val="C00000"/>
                         </a:solidFill>
@@ -6651,8 +6299,7 @@
                       </a:endParaRPr>
                     </a:p>
                     <a:p>
-                      <a:pPr algn="ctr"/>
-                      <a:endParaRPr lang="es-MX" sz="1800" b="1" kern="1200" dirty="0" smtClean="0">
+                      <a:endParaRPr lang="es-MX" sz="1800" kern="1200" dirty="0" smtClean="0">
                         <a:solidFill>
                           <a:srgbClr val="C00000"/>
                         </a:solidFill>
@@ -6661,33 +6308,6 @@
                         <a:ea typeface="+mn-ea"/>
                         <a:cs typeface="+mn-cs"/>
                       </a:endParaRPr>
-                    </a:p>
-                    <a:p>
-                      <a:pPr algn="ctr"/>
-                      <a:endParaRPr lang="es-MX" sz="1800" b="1" kern="1200" dirty="0" smtClean="0">
-                        <a:solidFill>
-                          <a:srgbClr val="C00000"/>
-                        </a:solidFill>
-                        <a:effectLst/>
-                        <a:latin typeface="Arial Narrow" panose="020B0606020202030204" pitchFamily="34" charset="0"/>
-                        <a:ea typeface="+mn-ea"/>
-                        <a:cs typeface="+mn-cs"/>
-                      </a:endParaRPr>
-                    </a:p>
-                    <a:p>
-                      <a:pPr algn="ctr"/>
-                      <a:r>
-                        <a:rPr lang="es-MX" sz="1800" b="1" kern="1200" dirty="0" smtClean="0">
-                          <a:solidFill>
-                            <a:srgbClr val="C00000"/>
-                          </a:solidFill>
-                          <a:effectLst/>
-                          <a:latin typeface="Arial Narrow" panose="020B0606020202030204" pitchFamily="34" charset="0"/>
-                          <a:ea typeface="+mn-ea"/>
-                          <a:cs typeface="+mn-cs"/>
-                        </a:rPr>
-                        <a:t>INFORMACIÓN GENERAL</a:t>
-                      </a:r>
                     </a:p>
                     <a:p>
                       <a:endParaRPr lang="es-MX" sz="1800" kern="1200" dirty="0" smtClean="0">
@@ -7119,70 +6739,15 @@
                 <a:ea typeface="Calibri"/>
                 <a:cs typeface="Times New Roman"/>
               </a:rPr>
-              <a:t>Obras Proyectadas</a:t>
-            </a:r>
-            <a:r>
-              <a:rPr lang="es-MX" sz="1200" dirty="0" smtClean="0">
+              <a:t>Obras </a:t>
+            </a:r>
+            <a:r>
+              <a:rPr lang="es-MX" sz="1400" dirty="0" smtClean="0">
                 <a:latin typeface="Arial Narrow" panose="020B0606020202030204" pitchFamily="34" charset="0"/>
                 <a:ea typeface="Calibri"/>
                 <a:cs typeface="Times New Roman"/>
               </a:rPr>
-              <a:t/>
-            </a:r>
-            <a:br>
-              <a:rPr lang="es-MX" sz="1200" dirty="0" smtClean="0">
-                <a:latin typeface="Arial Narrow" panose="020B0606020202030204" pitchFamily="34" charset="0"/>
-                <a:ea typeface="Calibri"/>
-                <a:cs typeface="Times New Roman"/>
-              </a:rPr>
-            </a:br>
-            <a:r>
-              <a:rPr lang="es-MX" sz="1200" dirty="0" smtClean="0">
-                <a:latin typeface="Arial Narrow" panose="020B0606020202030204" pitchFamily="34" charset="0"/>
-                <a:ea typeface="Calibri"/>
-                <a:cs typeface="Times New Roman"/>
-              </a:rPr>
-              <a:t>reportadas </a:t>
-            </a:r>
-            <a:r>
-              <a:rPr lang="es-MX" sz="1200" dirty="0">
-                <a:latin typeface="Arial Narrow" panose="020B0606020202030204" pitchFamily="34" charset="0"/>
-                <a:ea typeface="Calibri"/>
-                <a:cs typeface="Times New Roman"/>
-              </a:rPr>
-              <a:t>por las </a:t>
-            </a:r>
-            <a:r>
-              <a:rPr lang="es-MX" sz="1200" dirty="0" smtClean="0">
-                <a:latin typeface="Arial Narrow" panose="020B0606020202030204" pitchFamily="34" charset="0"/>
-                <a:ea typeface="Calibri"/>
-                <a:cs typeface="Times New Roman"/>
-              </a:rPr>
-              <a:t>Dependencias </a:t>
-            </a:r>
-            <a:r>
-              <a:rPr lang="es-MX" sz="1200" dirty="0">
-                <a:latin typeface="Arial Narrow" panose="020B0606020202030204" pitchFamily="34" charset="0"/>
-                <a:ea typeface="Calibri"/>
-                <a:cs typeface="Times New Roman"/>
-              </a:rPr>
-              <a:t>y Entidades </a:t>
-            </a:r>
-            <a:r>
-              <a:rPr lang="es-MX" sz="1200" dirty="0" smtClean="0">
-                <a:latin typeface="Arial Narrow" panose="020B0606020202030204" pitchFamily="34" charset="0"/>
-                <a:ea typeface="Calibri"/>
-                <a:cs typeface="Times New Roman"/>
-              </a:rPr>
-              <a:t>de </a:t>
-            </a:r>
-            <a:r>
-              <a:rPr lang="es-MX" sz="1200" dirty="0">
-                <a:latin typeface="Arial Narrow" panose="020B0606020202030204" pitchFamily="34" charset="0"/>
-                <a:ea typeface="Calibri"/>
-                <a:cs typeface="Times New Roman"/>
-              </a:rPr>
-              <a:t>la Administración Pública Federal</a:t>
+              <a:t>Proyectadas</a:t>
             </a:r>
             <a:endParaRPr lang="es-MX" sz="1200" dirty="0">
               <a:solidFill>
@@ -7237,7 +6802,7 @@
         </p:nvSpPr>
         <p:spPr>
           <a:xfrm>
-            <a:off x="2764457" y="4550733"/>
+            <a:off x="2832697" y="3568093"/>
             <a:ext cx="786809" cy="307777"/>
           </a:xfrm>
           <a:prstGeom prst="rect">
@@ -7272,7 +6837,7 @@
         </p:nvSpPr>
         <p:spPr>
           <a:xfrm>
-            <a:off x="4180114" y="4835001"/>
+            <a:off x="4180114" y="3879657"/>
             <a:ext cx="1745673" cy="307777"/>
           </a:xfrm>
           <a:prstGeom prst="rect">

</xml_diff>